<commit_message>
Flight stick pitch axis mounting update
Updated Base plate and FWD travel stops to eliminate interference with LIP.
Closes #999
</commit_message>
<xml_diff>
--- a/docs/OPENHORNET BETA ROADMAP.pptx
+++ b/docs/OPENHORNET BETA ROADMAP.pptx
@@ -226,7 +226,7 @@
           <a:p>
             <a:fld id="{2323F10A-5BE5-4EE5-83A9-FC7FBAB5AC38}" type="datetimeFigureOut">
               <a:rPr lang="en-US" smtClean="0"/>
-              <a:t>11/5/2023</a:t>
+              <a:t>11/15/2023</a:t>
             </a:fld>
             <a:endParaRPr lang="en-US" dirty="0"/>
           </a:p>
@@ -403,7 +403,7 @@
           <a:p>
             <a:fld id="{56727D22-D115-4CF2-BE84-ED8A12B36F7E}" type="datetimeFigureOut">
               <a:rPr lang="en-US" noProof="0" smtClean="0"/>
-              <a:t>11/5/2023</a:t>
+              <a:t>11/15/2023</a:t>
             </a:fld>
             <a:endParaRPr lang="en-US" noProof="0" dirty="0"/>
           </a:p>
@@ -5203,7 +5203,7 @@
           <a:p>
             <a:r>
               <a:rPr lang="en-US" dirty="0"/>
-              <a:t>v1.0.0-beta1</a:t>
+              <a:t>v0.2.0</a:t>
             </a:r>
             <a:endParaRPr lang="ru-RU" dirty="0"/>
           </a:p>
@@ -5354,7 +5354,7 @@
           <a:p>
             <a:r>
               <a:rPr lang="en-US" dirty="0"/>
-              <a:t>v1.0.0-beta2</a:t>
+              <a:t>v0.3.0</a:t>
             </a:r>
             <a:endParaRPr lang="ru-RU" dirty="0"/>
           </a:p>
@@ -5526,7 +5526,7 @@
           <a:p>
             <a:r>
               <a:rPr lang="en-US" dirty="0"/>
-              <a:t>v1.0.0-beta3</a:t>
+              <a:t>v0.4.0</a:t>
             </a:r>
             <a:endParaRPr lang="ru-RU" dirty="0"/>
           </a:p>
@@ -5665,7 +5665,7 @@
           <a:p>
             <a:r>
               <a:rPr lang="en-US" dirty="0"/>
-              <a:t>v1.0.0-beta4</a:t>
+              <a:t>v0.5.0</a:t>
             </a:r>
             <a:endParaRPr lang="ru-RU" dirty="0"/>
           </a:p>
@@ -5802,7 +5802,7 @@
           <a:p>
             <a:r>
               <a:rPr lang="en-US" dirty="0"/>
-              <a:t>v1.0.0-beta5</a:t>
+              <a:t>v0.6.0</a:t>
             </a:r>
             <a:endParaRPr lang="ru-RU" dirty="0"/>
           </a:p>
@@ -5942,7 +5942,7 @@
           <a:p>
             <a:r>
               <a:rPr lang="en-US" dirty="0"/>
-              <a:t>v1.0.0-beta6</a:t>
+              <a:t>v0.7.0</a:t>
             </a:r>
             <a:endParaRPr lang="ru-RU" dirty="0"/>
           </a:p>
@@ -6072,7 +6072,7 @@
           <a:p>
             <a:r>
               <a:rPr lang="en-US" dirty="0"/>
-              <a:t>v1.0.0-beta7</a:t>
+              <a:t>v0.8.0</a:t>
             </a:r>
             <a:endParaRPr lang="ru-RU" dirty="0"/>
           </a:p>
@@ -6206,7 +6206,7 @@
           <a:p>
             <a:r>
               <a:rPr lang="en-US" dirty="0"/>
-              <a:t>v1.0.0-beta8</a:t>
+              <a:t>v0.9.0</a:t>
             </a:r>
             <a:endParaRPr lang="ru-RU" dirty="0"/>
           </a:p>
@@ -6336,8 +6336,8 @@
           <a:lstStyle/>
           <a:p>
             <a:r>
-              <a:rPr lang="en-US" dirty="0"/>
-              <a:t>v1.0.0-beta9</a:t>
+              <a:rPr lang="en-US"/>
+              <a:t>v0.10.0</a:t>
             </a:r>
             <a:endParaRPr lang="ru-RU" dirty="0"/>
           </a:p>
@@ -7583,23 +7583,6 @@
 </file>
 
 <file path=customXml/item1.xml><?xml version="1.0" encoding="utf-8"?>
-<?mso-contentType ?>
-<FormTemplates xmlns="http://schemas.microsoft.com/sharepoint/v3/contenttype/forms">
-  <Display>DocumentLibraryForm</Display>
-  <Edit>DocumentLibraryForm</Edit>
-  <New>DocumentLibraryForm</New>
-</FormTemplates>
-</file>
-
-<file path=customXml/item2.xml><?xml version="1.0" encoding="utf-8"?>
-<p:properties xmlns:p="http://schemas.microsoft.com/office/2006/metadata/properties" xmlns:xsi="http://www.w3.org/2001/XMLSchema-instance" xmlns:pc="http://schemas.microsoft.com/office/infopath/2007/PartnerControls">
-  <documentManagement>
-    <MediaServiceKeyPoints xmlns="71af3243-3dd4-4a8d-8c0d-dd76da1f02a5" xsi:nil="true"/>
-  </documentManagement>
-</p:properties>
-</file>
-
-<file path=customXml/item3.xml><?xml version="1.0" encoding="utf-8"?>
 <ct:contentTypeSchema xmlns:ct="http://schemas.microsoft.com/office/2006/metadata/contentType" xmlns:ma="http://schemas.microsoft.com/office/2006/metadata/properties/metaAttributes" ct:_="" ma:_="" ma:contentTypeName="Document" ma:contentTypeID="0x01010079F111ED35F8CC479449609E8A0923A6" ma:contentTypeVersion="11" ma:contentTypeDescription="Create a new document." ma:contentTypeScope="" ma:versionID="9677210f24a1be23c92c90fd886aa0aa">
   <xsd:schema xmlns:xsd="http://www.w3.org/2001/XMLSchema" xmlns:xs="http://www.w3.org/2001/XMLSchema" xmlns:p="http://schemas.microsoft.com/office/2006/metadata/properties" xmlns:ns2="71af3243-3dd4-4a8d-8c0d-dd76da1f02a5" xmlns:ns3="16c05727-aa75-4e4a-9b5f-8a80a1165891" targetNamespace="http://schemas.microsoft.com/office/2006/metadata/properties" ma:root="true" ma:fieldsID="60e05723c5c1908df1a1a4ebf11d344e" ns2:_="" ns3:_="">
     <xsd:import namespace="71af3243-3dd4-4a8d-8c0d-dd76da1f02a5"/>
@@ -7810,25 +7793,24 @@
 </ct:contentTypeSchema>
 </file>
 
-<file path=customXml/itemProps1.xml><?xml version="1.0" encoding="utf-8"?>
-<ds:datastoreItem xmlns:ds="http://schemas.openxmlformats.org/officeDocument/2006/customXml" ds:itemID="{599253B6-8750-4AE7-9310-C85B843486D6}">
-  <ds:schemaRefs>
-    <ds:schemaRef ds:uri="http://schemas.microsoft.com/sharepoint/v3/contenttype/forms"/>
-  </ds:schemaRefs>
-</ds:datastoreItem>
+<file path=customXml/item2.xml><?xml version="1.0" encoding="utf-8"?>
+<p:properties xmlns:p="http://schemas.microsoft.com/office/2006/metadata/properties" xmlns:xsi="http://www.w3.org/2001/XMLSchema-instance" xmlns:pc="http://schemas.microsoft.com/office/infopath/2007/PartnerControls">
+  <documentManagement>
+    <MediaServiceKeyPoints xmlns="71af3243-3dd4-4a8d-8c0d-dd76da1f02a5" xsi:nil="true"/>
+  </documentManagement>
+</p:properties>
 </file>
 
-<file path=customXml/itemProps2.xml><?xml version="1.0" encoding="utf-8"?>
-<ds:datastoreItem xmlns:ds="http://schemas.openxmlformats.org/officeDocument/2006/customXml" ds:itemID="{A69BB5DF-A591-4D29-BE35-88A9CE3D2EA6}">
-  <ds:schemaRefs>
-    <ds:schemaRef ds:uri="http://schemas.microsoft.com/office/2006/metadata/properties"/>
-    <ds:schemaRef ds:uri="http://schemas.microsoft.com/office/infopath/2007/PartnerControls"/>
-    <ds:schemaRef ds:uri="71af3243-3dd4-4a8d-8c0d-dd76da1f02a5"/>
-  </ds:schemaRefs>
-</ds:datastoreItem>
+<file path=customXml/item3.xml><?xml version="1.0" encoding="utf-8"?>
+<?mso-contentType ?>
+<FormTemplates xmlns="http://schemas.microsoft.com/sharepoint/v3/contenttype/forms">
+  <Display>DocumentLibraryForm</Display>
+  <Edit>DocumentLibraryForm</Edit>
+  <New>DocumentLibraryForm</New>
+</FormTemplates>
 </file>
 
-<file path=customXml/itemProps3.xml><?xml version="1.0" encoding="utf-8"?>
+<file path=customXml/itemProps1.xml><?xml version="1.0" encoding="utf-8"?>
 <ds:datastoreItem xmlns:ds="http://schemas.openxmlformats.org/officeDocument/2006/customXml" ds:itemID="{FB497774-A265-4891-A41E-034F9A8FA7C5}">
   <ds:schemaRefs>
     <ds:schemaRef ds:uri="http://schemas.microsoft.com/office/2006/metadata/contentType"/>
@@ -7845,4 +7827,22 @@
     <ds:schemaRef ds:uri="http://schemas.microsoft.com/internal/obd"/>
   </ds:schemaRefs>
 </ds:datastoreItem>
+</file>
+
+<file path=customXml/itemProps2.xml><?xml version="1.0" encoding="utf-8"?>
+<ds:datastoreItem xmlns:ds="http://schemas.openxmlformats.org/officeDocument/2006/customXml" ds:itemID="{A69BB5DF-A591-4D29-BE35-88A9CE3D2EA6}">
+  <ds:schemaRefs>
+    <ds:schemaRef ds:uri="http://schemas.microsoft.com/office/2006/metadata/properties"/>
+    <ds:schemaRef ds:uri="http://schemas.microsoft.com/office/infopath/2007/PartnerControls"/>
+    <ds:schemaRef ds:uri="71af3243-3dd4-4a8d-8c0d-dd76da1f02a5"/>
+  </ds:schemaRefs>
+</ds:datastoreItem>
+</file>
+
+<file path=customXml/itemProps3.xml><?xml version="1.0" encoding="utf-8"?>
+<ds:datastoreItem xmlns:ds="http://schemas.openxmlformats.org/officeDocument/2006/customXml" ds:itemID="{599253B6-8750-4AE7-9310-C85B843486D6}">
+  <ds:schemaRefs>
+    <ds:schemaRef ds:uri="http://schemas.microsoft.com/sharepoint/v3/contenttype/forms"/>
+  </ds:schemaRefs>
+</ds:datastoreItem>
 </file>
</xml_diff>